<commit_message>
power point finished and minor changes in notebook
</commit_message>
<xml_diff>
--- a/COVID-19/presentations/Checkpoint 10 de Maio.pptx
+++ b/COVID-19/presentations/Checkpoint 10 de Maio.pptx
@@ -4151,7 +4151,7 @@
         <p:spPr>
           <a:xfrm>
             <a:off x="5004886" y="2733348"/>
-            <a:ext cx="6439399" cy="1384995"/>
+            <a:ext cx="6439399" cy="1292662"/>
           </a:xfrm>
           <a:prstGeom prst="rect">
             <a:avLst/>
@@ -4173,10 +4173,34 @@
             </a:r>
           </a:p>
           <a:p>
-            <a:endParaRPr lang="en-GB" sz="2400" dirty="0">
-              <a:latin typeface="Optima" panose="02000503060000020004" pitchFamily="2" charset="0"/>
-              <a:cs typeface="Berlin Sans FB" panose="020F0502020204030204" pitchFamily="34" charset="0"/>
-            </a:endParaRPr>
+            <a:r>
+              <a:rPr lang="en-GB" dirty="0" err="1">
+                <a:latin typeface="Optima" panose="02000503060000020004" pitchFamily="2" charset="0"/>
+                <a:cs typeface="Berlin Sans FB" panose="020F0502020204030204" pitchFamily="34" charset="0"/>
+              </a:rPr>
+              <a:t>Unidade</a:t>
+            </a:r>
+            <a:r>
+              <a:rPr lang="en-GB" dirty="0">
+                <a:latin typeface="Optima" panose="02000503060000020004" pitchFamily="2" charset="0"/>
+                <a:cs typeface="Berlin Sans FB" panose="020F0502020204030204" pitchFamily="34" charset="0"/>
+              </a:rPr>
+              <a:t> Curricular: </a:t>
+            </a:r>
+            <a:r>
+              <a:rPr lang="en-GB" dirty="0" err="1">
+                <a:latin typeface="Optima" panose="02000503060000020004" pitchFamily="2" charset="0"/>
+                <a:cs typeface="Berlin Sans FB" panose="020F0502020204030204" pitchFamily="34" charset="0"/>
+              </a:rPr>
+              <a:t>Inteligência</a:t>
+            </a:r>
+            <a:r>
+              <a:rPr lang="en-GB" dirty="0">
+                <a:latin typeface="Optima" panose="02000503060000020004" pitchFamily="2" charset="0"/>
+                <a:cs typeface="Berlin Sans FB" panose="020F0502020204030204" pitchFamily="34" charset="0"/>
+              </a:rPr>
+              <a:t> Artificial</a:t>
+            </a:r>
           </a:p>
           <a:p>
             <a:r>
@@ -4777,7 +4801,7 @@
         <p:spPr>
           <a:xfrm>
             <a:off x="609349" y="502365"/>
-            <a:ext cx="6439399" cy="461665"/>
+            <a:ext cx="6439399" cy="523220"/>
           </a:xfrm>
           <a:prstGeom prst="rect">
             <a:avLst/>
@@ -4791,27 +4815,27 @@
           <a:lstStyle/>
           <a:p>
             <a:r>
-              <a:rPr lang="en-GB" sz="2400" dirty="0" err="1">
+              <a:rPr lang="en-GB" sz="2800" dirty="0" err="1">
                 <a:latin typeface="Optima" panose="02000503060000020004" pitchFamily="2" charset="0"/>
                 <a:cs typeface="Berlin Sans FB" panose="020F0502020204030204" pitchFamily="34" charset="0"/>
               </a:rPr>
               <a:t>Definição</a:t>
             </a:r>
             <a:r>
-              <a:rPr lang="en-GB" sz="2400" dirty="0">
+              <a:rPr lang="en-GB" sz="2800" dirty="0">
                 <a:latin typeface="Optima" panose="02000503060000020004" pitchFamily="2" charset="0"/>
                 <a:cs typeface="Berlin Sans FB" panose="020F0502020204030204" pitchFamily="34" charset="0"/>
               </a:rPr>
               <a:t> do </a:t>
             </a:r>
             <a:r>
-              <a:rPr lang="en-GB" sz="2400" dirty="0" err="1">
+              <a:rPr lang="en-GB" sz="2800" dirty="0" err="1">
                 <a:latin typeface="Optima" panose="02000503060000020004" pitchFamily="2" charset="0"/>
                 <a:cs typeface="Berlin Sans FB" panose="020F0502020204030204" pitchFamily="34" charset="0"/>
               </a:rPr>
               <a:t>problema</a:t>
             </a:r>
-            <a:endParaRPr lang="en-GB" sz="2400" dirty="0">
+            <a:endParaRPr lang="en-GB" sz="2800" dirty="0">
               <a:latin typeface="Optima" panose="02000503060000020004" pitchFamily="2" charset="0"/>
               <a:cs typeface="Berlin Sans FB" panose="020F0502020204030204" pitchFamily="34" charset="0"/>
             </a:endParaRPr>
@@ -6537,7 +6561,7 @@
         <p:spPr>
           <a:xfrm>
             <a:off x="609349" y="502365"/>
-            <a:ext cx="6439399" cy="461665"/>
+            <a:ext cx="6439399" cy="523220"/>
           </a:xfrm>
           <a:prstGeom prst="rect">
             <a:avLst/>
@@ -6551,20 +6575,20 @@
           <a:lstStyle/>
           <a:p>
             <a:r>
-              <a:rPr lang="en-GB" sz="2400" dirty="0">
+              <a:rPr lang="en-GB" sz="2800" dirty="0">
                 <a:latin typeface="Optima" panose="02000503060000020004" pitchFamily="2" charset="0"/>
                 <a:cs typeface="Berlin Sans FB" panose="020F0502020204030204" pitchFamily="34" charset="0"/>
               </a:rPr>
               <a:t>Ferramentas a </a:t>
             </a:r>
             <a:r>
-              <a:rPr lang="en-GB" sz="2400" dirty="0" err="1">
+              <a:rPr lang="en-GB" sz="2800" dirty="0" err="1">
                 <a:latin typeface="Optima" panose="02000503060000020004" pitchFamily="2" charset="0"/>
                 <a:cs typeface="Berlin Sans FB" panose="020F0502020204030204" pitchFamily="34" charset="0"/>
               </a:rPr>
               <a:t>utilizar</a:t>
             </a:r>
-            <a:endParaRPr lang="en-GB" sz="2400" dirty="0">
+            <a:endParaRPr lang="en-GB" sz="2800" dirty="0">
               <a:latin typeface="Optima" panose="02000503060000020004" pitchFamily="2" charset="0"/>
               <a:cs typeface="Berlin Sans FB" panose="020F0502020204030204" pitchFamily="34" charset="0"/>
             </a:endParaRPr>
@@ -8348,7 +8372,7 @@
         <p:spPr>
           <a:xfrm>
             <a:off x="609349" y="502365"/>
-            <a:ext cx="6439399" cy="461665"/>
+            <a:ext cx="6439399" cy="523220"/>
           </a:xfrm>
           <a:prstGeom prst="rect">
             <a:avLst/>
@@ -8362,20 +8386,20 @@
           <a:lstStyle/>
           <a:p>
             <a:r>
-              <a:rPr lang="en-GB" sz="2400" dirty="0">
+              <a:rPr lang="en-GB" sz="2800" dirty="0">
                 <a:latin typeface="Optima" panose="02000503060000020004" pitchFamily="2" charset="0"/>
                 <a:cs typeface="Berlin Sans FB" panose="020F0502020204030204" pitchFamily="34" charset="0"/>
               </a:rPr>
               <a:t>Ferramentas a </a:t>
             </a:r>
             <a:r>
-              <a:rPr lang="en-GB" sz="2400" dirty="0" err="1">
+              <a:rPr lang="en-GB" sz="2800" dirty="0" err="1">
                 <a:latin typeface="Optima" panose="02000503060000020004" pitchFamily="2" charset="0"/>
                 <a:cs typeface="Berlin Sans FB" panose="020F0502020204030204" pitchFamily="34" charset="0"/>
               </a:rPr>
               <a:t>utilizar</a:t>
             </a:r>
-            <a:endParaRPr lang="en-GB" sz="2400" dirty="0">
+            <a:endParaRPr lang="en-GB" sz="2800" dirty="0">
               <a:latin typeface="Optima" panose="02000503060000020004" pitchFamily="2" charset="0"/>
               <a:cs typeface="Berlin Sans FB" panose="020F0502020204030204" pitchFamily="34" charset="0"/>
             </a:endParaRPr>
@@ -9671,7 +9695,7 @@
         <p:spPr>
           <a:xfrm>
             <a:off x="609349" y="502365"/>
-            <a:ext cx="6439399" cy="461665"/>
+            <a:ext cx="6439399" cy="523220"/>
           </a:xfrm>
           <a:prstGeom prst="rect">
             <a:avLst/>
@@ -9685,13 +9709,13 @@
           <a:lstStyle/>
           <a:p>
             <a:r>
-              <a:rPr lang="en-GB" sz="2400" dirty="0" err="1">
+              <a:rPr lang="en-GB" sz="2800" dirty="0" err="1">
                 <a:latin typeface="Optima" panose="02000503060000020004" pitchFamily="2" charset="0"/>
                 <a:cs typeface="Berlin Sans FB" panose="020F0502020204030204" pitchFamily="34" charset="0"/>
               </a:rPr>
               <a:t>Resultados</a:t>
             </a:r>
-            <a:endParaRPr lang="en-GB" sz="2400" dirty="0">
+            <a:endParaRPr lang="en-GB" sz="2800" dirty="0">
               <a:latin typeface="Optima" panose="02000503060000020004" pitchFamily="2" charset="0"/>
               <a:cs typeface="Berlin Sans FB" panose="020F0502020204030204" pitchFamily="34" charset="0"/>
             </a:endParaRPr>
@@ -14759,7 +14783,7 @@
         <p:spPr>
           <a:xfrm>
             <a:off x="609349" y="502365"/>
-            <a:ext cx="6439399" cy="461665"/>
+            <a:ext cx="6439399" cy="523220"/>
           </a:xfrm>
           <a:prstGeom prst="rect">
             <a:avLst/>
@@ -14773,27 +14797,27 @@
           <a:lstStyle/>
           <a:p>
             <a:r>
-              <a:rPr lang="en-GB" sz="2400" dirty="0" err="1">
+              <a:rPr lang="en-GB" sz="2800" dirty="0" err="1">
                 <a:latin typeface="Optima" panose="02000503060000020004" pitchFamily="2" charset="0"/>
                 <a:cs typeface="Berlin Sans FB" panose="020F0502020204030204" pitchFamily="34" charset="0"/>
               </a:rPr>
               <a:t>Trabalho</a:t>
             </a:r>
             <a:r>
-              <a:rPr lang="en-GB" sz="2400" dirty="0">
+              <a:rPr lang="en-GB" sz="2800" dirty="0">
                 <a:latin typeface="Optima" panose="02000503060000020004" pitchFamily="2" charset="0"/>
                 <a:cs typeface="Berlin Sans FB" panose="020F0502020204030204" pitchFamily="34" charset="0"/>
               </a:rPr>
               <a:t> </a:t>
             </a:r>
             <a:r>
-              <a:rPr lang="en-GB" sz="2400" dirty="0" err="1">
+              <a:rPr lang="en-GB" sz="2800" dirty="0" err="1">
                 <a:latin typeface="Optima" panose="02000503060000020004" pitchFamily="2" charset="0"/>
                 <a:cs typeface="Berlin Sans FB" panose="020F0502020204030204" pitchFamily="34" charset="0"/>
               </a:rPr>
               <a:t>futuro</a:t>
             </a:r>
-            <a:endParaRPr lang="en-GB" sz="2400" dirty="0">
+            <a:endParaRPr lang="en-GB" sz="2800" dirty="0">
               <a:latin typeface="Optima" panose="02000503060000020004" pitchFamily="2" charset="0"/>
               <a:cs typeface="Berlin Sans FB" panose="020F0502020204030204" pitchFamily="34" charset="0"/>
             </a:endParaRPr>

</xml_diff>